<commit_message>
Versão inicial do código para relatórios
</commit_message>
<xml_diff>
--- a/templates/[GARN] Modelo de apresentação de slides.pptx
+++ b/templates/[GARN] Modelo de apresentação de slides.pptx
@@ -19906,42 +19906,6 @@
               <a:t>Autoavaliação</a:t>
             </a:r>
           </a:p>
-          <a:p>
-            <a:pPr algn="ctr">
-              <a:lnSpc>
-                <a:spcPct val="150000"/>
-              </a:lnSpc>
-            </a:pPr>
-            <a:r>
-              <a:rPr lang="pt-BR" sz="1400" dirty="0">
-                <a:solidFill>
-                  <a:srgbClr val="CC8A42"/>
-                </a:solidFill>
-              </a:rPr>
-              <a:t>{{</a:t>
-            </a:r>
-            <a:r>
-              <a:rPr lang="pt-BR" sz="1400" dirty="0" err="1">
-                <a:solidFill>
-                  <a:srgbClr val="CC8A42"/>
-                </a:solidFill>
-              </a:rPr>
-              <a:t>nota_auto</a:t>
-            </a:r>
-            <a:r>
-              <a:rPr lang="pt-BR" sz="1400" dirty="0">
-                <a:solidFill>
-                  <a:srgbClr val="CC8A42"/>
-                </a:solidFill>
-              </a:rPr>
-              <a:t>}}</a:t>
-            </a:r>
-            <a:endParaRPr lang="pt-BR" dirty="0">
-              <a:solidFill>
-                <a:srgbClr val="CC8A42"/>
-              </a:solidFill>
-            </a:endParaRPr>
-          </a:p>
         </p:txBody>
       </p:sp>
       <p:sp>
@@ -20232,42 +20196,6 @@
               </a:rPr>
               <a:t>Avaliação dos Líderes</a:t>
             </a:r>
-          </a:p>
-          <a:p>
-            <a:pPr algn="ctr">
-              <a:lnSpc>
-                <a:spcPct val="150000"/>
-              </a:lnSpc>
-            </a:pPr>
-            <a:r>
-              <a:rPr lang="pt-BR" sz="1400" dirty="0">
-                <a:solidFill>
-                  <a:srgbClr val="CC8A42"/>
-                </a:solidFill>
-              </a:rPr>
-              <a:t>{{</a:t>
-            </a:r>
-            <a:r>
-              <a:rPr lang="pt-BR" sz="1400" dirty="0" err="1">
-                <a:solidFill>
-                  <a:srgbClr val="CC8A42"/>
-                </a:solidFill>
-              </a:rPr>
-              <a:t>nota_lider</a:t>
-            </a:r>
-            <a:r>
-              <a:rPr lang="pt-BR" sz="1400" dirty="0">
-                <a:solidFill>
-                  <a:srgbClr val="CC8A42"/>
-                </a:solidFill>
-              </a:rPr>
-              <a:t>}}</a:t>
-            </a:r>
-            <a:endParaRPr lang="pt-BR" dirty="0">
-              <a:solidFill>
-                <a:srgbClr val="CC8A42"/>
-              </a:solidFill>
-            </a:endParaRPr>
           </a:p>
         </p:txBody>
       </p:sp>
@@ -20560,42 +20488,6 @@
               <a:t>Avaliação dos Liderados</a:t>
             </a:r>
           </a:p>
-          <a:p>
-            <a:pPr algn="ctr">
-              <a:lnSpc>
-                <a:spcPct val="150000"/>
-              </a:lnSpc>
-            </a:pPr>
-            <a:r>
-              <a:rPr lang="pt-BR" sz="1400" dirty="0">
-                <a:solidFill>
-                  <a:srgbClr val="CC8A42"/>
-                </a:solidFill>
-              </a:rPr>
-              <a:t>{{</a:t>
-            </a:r>
-            <a:r>
-              <a:rPr lang="pt-BR" sz="1400" dirty="0" err="1">
-                <a:solidFill>
-                  <a:srgbClr val="CC8A42"/>
-                </a:solidFill>
-              </a:rPr>
-              <a:t>nota_liderado</a:t>
-            </a:r>
-            <a:r>
-              <a:rPr lang="pt-BR" sz="1400" dirty="0">
-                <a:solidFill>
-                  <a:srgbClr val="CC8A42"/>
-                </a:solidFill>
-              </a:rPr>
-              <a:t>}}</a:t>
-            </a:r>
-            <a:endParaRPr lang="pt-BR" dirty="0">
-              <a:solidFill>
-                <a:srgbClr val="CC8A42"/>
-              </a:solidFill>
-            </a:endParaRPr>
-          </a:p>
         </p:txBody>
       </p:sp>
       <p:sp>
@@ -20893,6 +20785,954 @@
                 </a:solidFill>
               </a:rPr>
               <a:t>radar_geral</a:t>
+            </a:r>
+            <a:r>
+              <a:rPr lang="pt-BR" sz="1400" dirty="0">
+                <a:solidFill>
+                  <a:srgbClr val="CC8A42"/>
+                </a:solidFill>
+              </a:rPr>
+              <a:t>}}</a:t>
+            </a:r>
+            <a:endParaRPr lang="pt-BR" dirty="0">
+              <a:solidFill>
+                <a:srgbClr val="CC8A42"/>
+              </a:solidFill>
+            </a:endParaRPr>
+          </a:p>
+        </p:txBody>
+      </p:sp>
+      <p:sp>
+        <p:nvSpPr>
+          <p:cNvPr id="6" name="Google Shape;494;p69">
+            <a:extLst>
+              <a:ext uri="{FF2B5EF4-FFF2-40B4-BE49-F238E27FC236}">
+                <a16:creationId xmlns:a16="http://schemas.microsoft.com/office/drawing/2014/main" id="{5B6D0943-71A0-7942-6EC2-C5EC14CB0E04}"/>
+              </a:ext>
+            </a:extLst>
+          </p:cNvPr>
+          <p:cNvSpPr txBox="1">
+            <a:spLocks/>
+          </p:cNvSpPr>
+          <p:nvPr/>
+        </p:nvSpPr>
+        <p:spPr>
+          <a:xfrm>
+            <a:off x="2629158" y="1330036"/>
+            <a:ext cx="2005652" cy="528768"/>
+          </a:xfrm>
+          <a:prstGeom prst="rect">
+            <a:avLst/>
+          </a:prstGeom>
+          <a:noFill/>
+          <a:ln>
+            <a:noFill/>
+          </a:ln>
+        </p:spPr>
+        <p:txBody>
+          <a:bodyPr spcFirstLastPara="1" wrap="square" lIns="91425" tIns="91425" rIns="91425" bIns="91425" anchor="t" anchorCtr="0">
+            <a:normAutofit/>
+          </a:bodyPr>
+          <a:lstStyle>
+            <a:defPPr marR="0" lvl="0" algn="l" rtl="0">
+              <a:lnSpc>
+                <a:spcPct val="100000"/>
+              </a:lnSpc>
+              <a:spcBef>
+                <a:spcPts val="0"/>
+              </a:spcBef>
+              <a:spcAft>
+                <a:spcPts val="0"/>
+              </a:spcAft>
+            </a:defPPr>
+            <a:lvl1pPr marR="0" lvl="0" algn="l" rtl="0">
+              <a:lnSpc>
+                <a:spcPct val="100000"/>
+              </a:lnSpc>
+              <a:spcBef>
+                <a:spcPts val="0"/>
+              </a:spcBef>
+              <a:spcAft>
+                <a:spcPts val="0"/>
+              </a:spcAft>
+              <a:buClr>
+                <a:schemeClr val="lt1"/>
+              </a:buClr>
+              <a:buSzPts val="2000"/>
+              <a:buFont typeface="Nunito"/>
+              <a:buNone/>
+              <a:defRPr sz="2000" b="1" i="0" u="none" strike="noStrike" cap="none">
+                <a:solidFill>
+                  <a:schemeClr val="lt1"/>
+                </a:solidFill>
+                <a:latin typeface="Nunito"/>
+                <a:ea typeface="Nunito"/>
+                <a:cs typeface="Nunito"/>
+                <a:sym typeface="Nunito"/>
+              </a:defRPr>
+            </a:lvl1pPr>
+            <a:lvl2pPr marR="0" lvl="1" algn="l" rtl="0">
+              <a:lnSpc>
+                <a:spcPct val="100000"/>
+              </a:lnSpc>
+              <a:spcBef>
+                <a:spcPts val="0"/>
+              </a:spcBef>
+              <a:spcAft>
+                <a:spcPts val="0"/>
+              </a:spcAft>
+              <a:buClr>
+                <a:srgbClr val="FFF9D9"/>
+              </a:buClr>
+              <a:buSzPts val="2000"/>
+              <a:buFont typeface="Nunito"/>
+              <a:buNone/>
+              <a:defRPr sz="2000" b="1" i="0" u="none" strike="noStrike" cap="none">
+                <a:solidFill>
+                  <a:srgbClr val="FFF9D9"/>
+                </a:solidFill>
+                <a:latin typeface="Nunito"/>
+                <a:ea typeface="Nunito"/>
+                <a:cs typeface="Nunito"/>
+                <a:sym typeface="Nunito"/>
+              </a:defRPr>
+            </a:lvl2pPr>
+            <a:lvl3pPr marR="0" lvl="2" algn="l" rtl="0">
+              <a:lnSpc>
+                <a:spcPct val="100000"/>
+              </a:lnSpc>
+              <a:spcBef>
+                <a:spcPts val="0"/>
+              </a:spcBef>
+              <a:spcAft>
+                <a:spcPts val="0"/>
+              </a:spcAft>
+              <a:buClr>
+                <a:srgbClr val="FFF9D9"/>
+              </a:buClr>
+              <a:buSzPts val="2000"/>
+              <a:buFont typeface="Nunito"/>
+              <a:buNone/>
+              <a:defRPr sz="2000" b="1" i="0" u="none" strike="noStrike" cap="none">
+                <a:solidFill>
+                  <a:srgbClr val="FFF9D9"/>
+                </a:solidFill>
+                <a:latin typeface="Nunito"/>
+                <a:ea typeface="Nunito"/>
+                <a:cs typeface="Nunito"/>
+                <a:sym typeface="Nunito"/>
+              </a:defRPr>
+            </a:lvl3pPr>
+            <a:lvl4pPr marR="0" lvl="3" algn="l" rtl="0">
+              <a:lnSpc>
+                <a:spcPct val="100000"/>
+              </a:lnSpc>
+              <a:spcBef>
+                <a:spcPts val="0"/>
+              </a:spcBef>
+              <a:spcAft>
+                <a:spcPts val="0"/>
+              </a:spcAft>
+              <a:buClr>
+                <a:srgbClr val="FFF9D9"/>
+              </a:buClr>
+              <a:buSzPts val="2000"/>
+              <a:buFont typeface="Nunito"/>
+              <a:buNone/>
+              <a:defRPr sz="2000" b="1" i="0" u="none" strike="noStrike" cap="none">
+                <a:solidFill>
+                  <a:srgbClr val="FFF9D9"/>
+                </a:solidFill>
+                <a:latin typeface="Nunito"/>
+                <a:ea typeface="Nunito"/>
+                <a:cs typeface="Nunito"/>
+                <a:sym typeface="Nunito"/>
+              </a:defRPr>
+            </a:lvl4pPr>
+            <a:lvl5pPr marR="0" lvl="4" algn="l" rtl="0">
+              <a:lnSpc>
+                <a:spcPct val="100000"/>
+              </a:lnSpc>
+              <a:spcBef>
+                <a:spcPts val="0"/>
+              </a:spcBef>
+              <a:spcAft>
+                <a:spcPts val="0"/>
+              </a:spcAft>
+              <a:buClr>
+                <a:srgbClr val="FFF9D9"/>
+              </a:buClr>
+              <a:buSzPts val="2000"/>
+              <a:buFont typeface="Nunito"/>
+              <a:buNone/>
+              <a:defRPr sz="2000" b="1" i="0" u="none" strike="noStrike" cap="none">
+                <a:solidFill>
+                  <a:srgbClr val="FFF9D9"/>
+                </a:solidFill>
+                <a:latin typeface="Nunito"/>
+                <a:ea typeface="Nunito"/>
+                <a:cs typeface="Nunito"/>
+                <a:sym typeface="Nunito"/>
+              </a:defRPr>
+            </a:lvl5pPr>
+            <a:lvl6pPr marR="0" lvl="5" algn="l" rtl="0">
+              <a:lnSpc>
+                <a:spcPct val="100000"/>
+              </a:lnSpc>
+              <a:spcBef>
+                <a:spcPts val="0"/>
+              </a:spcBef>
+              <a:spcAft>
+                <a:spcPts val="0"/>
+              </a:spcAft>
+              <a:buClr>
+                <a:srgbClr val="FFF9D9"/>
+              </a:buClr>
+              <a:buSzPts val="2000"/>
+              <a:buFont typeface="Nunito"/>
+              <a:buNone/>
+              <a:defRPr sz="2000" b="1" i="0" u="none" strike="noStrike" cap="none">
+                <a:solidFill>
+                  <a:srgbClr val="FFF9D9"/>
+                </a:solidFill>
+                <a:latin typeface="Nunito"/>
+                <a:ea typeface="Nunito"/>
+                <a:cs typeface="Nunito"/>
+                <a:sym typeface="Nunito"/>
+              </a:defRPr>
+            </a:lvl6pPr>
+            <a:lvl7pPr marR="0" lvl="6" algn="l" rtl="0">
+              <a:lnSpc>
+                <a:spcPct val="100000"/>
+              </a:lnSpc>
+              <a:spcBef>
+                <a:spcPts val="0"/>
+              </a:spcBef>
+              <a:spcAft>
+                <a:spcPts val="0"/>
+              </a:spcAft>
+              <a:buClr>
+                <a:srgbClr val="FFF9D9"/>
+              </a:buClr>
+              <a:buSzPts val="2000"/>
+              <a:buFont typeface="Nunito"/>
+              <a:buNone/>
+              <a:defRPr sz="2000" b="1" i="0" u="none" strike="noStrike" cap="none">
+                <a:solidFill>
+                  <a:srgbClr val="FFF9D9"/>
+                </a:solidFill>
+                <a:latin typeface="Nunito"/>
+                <a:ea typeface="Nunito"/>
+                <a:cs typeface="Nunito"/>
+                <a:sym typeface="Nunito"/>
+              </a:defRPr>
+            </a:lvl7pPr>
+            <a:lvl8pPr marR="0" lvl="7" algn="l" rtl="0">
+              <a:lnSpc>
+                <a:spcPct val="100000"/>
+              </a:lnSpc>
+              <a:spcBef>
+                <a:spcPts val="0"/>
+              </a:spcBef>
+              <a:spcAft>
+                <a:spcPts val="0"/>
+              </a:spcAft>
+              <a:buClr>
+                <a:srgbClr val="FFF9D9"/>
+              </a:buClr>
+              <a:buSzPts val="2000"/>
+              <a:buFont typeface="Nunito"/>
+              <a:buNone/>
+              <a:defRPr sz="2000" b="1" i="0" u="none" strike="noStrike" cap="none">
+                <a:solidFill>
+                  <a:srgbClr val="FFF9D9"/>
+                </a:solidFill>
+                <a:latin typeface="Nunito"/>
+                <a:ea typeface="Nunito"/>
+                <a:cs typeface="Nunito"/>
+                <a:sym typeface="Nunito"/>
+              </a:defRPr>
+            </a:lvl8pPr>
+            <a:lvl9pPr marR="0" lvl="8" algn="l" rtl="0">
+              <a:lnSpc>
+                <a:spcPct val="100000"/>
+              </a:lnSpc>
+              <a:spcBef>
+                <a:spcPts val="0"/>
+              </a:spcBef>
+              <a:spcAft>
+                <a:spcPts val="0"/>
+              </a:spcAft>
+              <a:buClr>
+                <a:srgbClr val="FFF9D9"/>
+              </a:buClr>
+              <a:buSzPts val="2000"/>
+              <a:buFont typeface="Nunito"/>
+              <a:buNone/>
+              <a:defRPr sz="2000" b="1" i="0" u="none" strike="noStrike" cap="none">
+                <a:solidFill>
+                  <a:srgbClr val="FFF9D9"/>
+                </a:solidFill>
+                <a:latin typeface="Nunito"/>
+                <a:ea typeface="Nunito"/>
+                <a:cs typeface="Nunito"/>
+                <a:sym typeface="Nunito"/>
+              </a:defRPr>
+            </a:lvl9pPr>
+          </a:lstStyle>
+          <a:p>
+            <a:pPr algn="ctr">
+              <a:lnSpc>
+                <a:spcPct val="150000"/>
+              </a:lnSpc>
+            </a:pPr>
+            <a:r>
+              <a:rPr lang="pt-BR" sz="1400" dirty="0">
+                <a:solidFill>
+                  <a:srgbClr val="CC8A42"/>
+                </a:solidFill>
+              </a:rPr>
+              <a:t>{{</a:t>
+            </a:r>
+            <a:r>
+              <a:rPr lang="pt-BR" sz="1400" dirty="0" err="1">
+                <a:solidFill>
+                  <a:srgbClr val="CC8A42"/>
+                </a:solidFill>
+              </a:rPr>
+              <a:t>nota_auto</a:t>
+            </a:r>
+            <a:r>
+              <a:rPr lang="pt-BR" sz="1400" dirty="0">
+                <a:solidFill>
+                  <a:srgbClr val="CC8A42"/>
+                </a:solidFill>
+              </a:rPr>
+              <a:t>}}</a:t>
+            </a:r>
+            <a:endParaRPr lang="pt-BR" dirty="0">
+              <a:solidFill>
+                <a:srgbClr val="CC8A42"/>
+              </a:solidFill>
+            </a:endParaRPr>
+          </a:p>
+        </p:txBody>
+      </p:sp>
+      <p:sp>
+        <p:nvSpPr>
+          <p:cNvPr id="7" name="Google Shape;494;p69">
+            <a:extLst>
+              <a:ext uri="{FF2B5EF4-FFF2-40B4-BE49-F238E27FC236}">
+                <a16:creationId xmlns:a16="http://schemas.microsoft.com/office/drawing/2014/main" id="{D2569DED-A19C-1FD4-E265-65271FD8CC93}"/>
+              </a:ext>
+            </a:extLst>
+          </p:cNvPr>
+          <p:cNvSpPr txBox="1">
+            <a:spLocks/>
+          </p:cNvSpPr>
+          <p:nvPr/>
+        </p:nvSpPr>
+        <p:spPr>
+          <a:xfrm>
+            <a:off x="4663217" y="1330036"/>
+            <a:ext cx="2005652" cy="528768"/>
+          </a:xfrm>
+          <a:prstGeom prst="rect">
+            <a:avLst/>
+          </a:prstGeom>
+          <a:noFill/>
+          <a:ln>
+            <a:noFill/>
+          </a:ln>
+        </p:spPr>
+        <p:txBody>
+          <a:bodyPr spcFirstLastPara="1" wrap="square" lIns="91425" tIns="91425" rIns="91425" bIns="91425" anchor="t" anchorCtr="0">
+            <a:normAutofit/>
+          </a:bodyPr>
+          <a:lstStyle>
+            <a:defPPr marR="0" lvl="0" algn="l" rtl="0">
+              <a:lnSpc>
+                <a:spcPct val="100000"/>
+              </a:lnSpc>
+              <a:spcBef>
+                <a:spcPts val="0"/>
+              </a:spcBef>
+              <a:spcAft>
+                <a:spcPts val="0"/>
+              </a:spcAft>
+            </a:defPPr>
+            <a:lvl1pPr marR="0" lvl="0" algn="l" rtl="0">
+              <a:lnSpc>
+                <a:spcPct val="100000"/>
+              </a:lnSpc>
+              <a:spcBef>
+                <a:spcPts val="0"/>
+              </a:spcBef>
+              <a:spcAft>
+                <a:spcPts val="0"/>
+              </a:spcAft>
+              <a:buClr>
+                <a:schemeClr val="lt1"/>
+              </a:buClr>
+              <a:buSzPts val="2000"/>
+              <a:buFont typeface="Nunito"/>
+              <a:buNone/>
+              <a:defRPr sz="2000" b="1" i="0" u="none" strike="noStrike" cap="none">
+                <a:solidFill>
+                  <a:schemeClr val="lt1"/>
+                </a:solidFill>
+                <a:latin typeface="Nunito"/>
+                <a:ea typeface="Nunito"/>
+                <a:cs typeface="Nunito"/>
+                <a:sym typeface="Nunito"/>
+              </a:defRPr>
+            </a:lvl1pPr>
+            <a:lvl2pPr marR="0" lvl="1" algn="l" rtl="0">
+              <a:lnSpc>
+                <a:spcPct val="100000"/>
+              </a:lnSpc>
+              <a:spcBef>
+                <a:spcPts val="0"/>
+              </a:spcBef>
+              <a:spcAft>
+                <a:spcPts val="0"/>
+              </a:spcAft>
+              <a:buClr>
+                <a:srgbClr val="FFF9D9"/>
+              </a:buClr>
+              <a:buSzPts val="2000"/>
+              <a:buFont typeface="Nunito"/>
+              <a:buNone/>
+              <a:defRPr sz="2000" b="1" i="0" u="none" strike="noStrike" cap="none">
+                <a:solidFill>
+                  <a:srgbClr val="FFF9D9"/>
+                </a:solidFill>
+                <a:latin typeface="Nunito"/>
+                <a:ea typeface="Nunito"/>
+                <a:cs typeface="Nunito"/>
+                <a:sym typeface="Nunito"/>
+              </a:defRPr>
+            </a:lvl2pPr>
+            <a:lvl3pPr marR="0" lvl="2" algn="l" rtl="0">
+              <a:lnSpc>
+                <a:spcPct val="100000"/>
+              </a:lnSpc>
+              <a:spcBef>
+                <a:spcPts val="0"/>
+              </a:spcBef>
+              <a:spcAft>
+                <a:spcPts val="0"/>
+              </a:spcAft>
+              <a:buClr>
+                <a:srgbClr val="FFF9D9"/>
+              </a:buClr>
+              <a:buSzPts val="2000"/>
+              <a:buFont typeface="Nunito"/>
+              <a:buNone/>
+              <a:defRPr sz="2000" b="1" i="0" u="none" strike="noStrike" cap="none">
+                <a:solidFill>
+                  <a:srgbClr val="FFF9D9"/>
+                </a:solidFill>
+                <a:latin typeface="Nunito"/>
+                <a:ea typeface="Nunito"/>
+                <a:cs typeface="Nunito"/>
+                <a:sym typeface="Nunito"/>
+              </a:defRPr>
+            </a:lvl3pPr>
+            <a:lvl4pPr marR="0" lvl="3" algn="l" rtl="0">
+              <a:lnSpc>
+                <a:spcPct val="100000"/>
+              </a:lnSpc>
+              <a:spcBef>
+                <a:spcPts val="0"/>
+              </a:spcBef>
+              <a:spcAft>
+                <a:spcPts val="0"/>
+              </a:spcAft>
+              <a:buClr>
+                <a:srgbClr val="FFF9D9"/>
+              </a:buClr>
+              <a:buSzPts val="2000"/>
+              <a:buFont typeface="Nunito"/>
+              <a:buNone/>
+              <a:defRPr sz="2000" b="1" i="0" u="none" strike="noStrike" cap="none">
+                <a:solidFill>
+                  <a:srgbClr val="FFF9D9"/>
+                </a:solidFill>
+                <a:latin typeface="Nunito"/>
+                <a:ea typeface="Nunito"/>
+                <a:cs typeface="Nunito"/>
+                <a:sym typeface="Nunito"/>
+              </a:defRPr>
+            </a:lvl4pPr>
+            <a:lvl5pPr marR="0" lvl="4" algn="l" rtl="0">
+              <a:lnSpc>
+                <a:spcPct val="100000"/>
+              </a:lnSpc>
+              <a:spcBef>
+                <a:spcPts val="0"/>
+              </a:spcBef>
+              <a:spcAft>
+                <a:spcPts val="0"/>
+              </a:spcAft>
+              <a:buClr>
+                <a:srgbClr val="FFF9D9"/>
+              </a:buClr>
+              <a:buSzPts val="2000"/>
+              <a:buFont typeface="Nunito"/>
+              <a:buNone/>
+              <a:defRPr sz="2000" b="1" i="0" u="none" strike="noStrike" cap="none">
+                <a:solidFill>
+                  <a:srgbClr val="FFF9D9"/>
+                </a:solidFill>
+                <a:latin typeface="Nunito"/>
+                <a:ea typeface="Nunito"/>
+                <a:cs typeface="Nunito"/>
+                <a:sym typeface="Nunito"/>
+              </a:defRPr>
+            </a:lvl5pPr>
+            <a:lvl6pPr marR="0" lvl="5" algn="l" rtl="0">
+              <a:lnSpc>
+                <a:spcPct val="100000"/>
+              </a:lnSpc>
+              <a:spcBef>
+                <a:spcPts val="0"/>
+              </a:spcBef>
+              <a:spcAft>
+                <a:spcPts val="0"/>
+              </a:spcAft>
+              <a:buClr>
+                <a:srgbClr val="FFF9D9"/>
+              </a:buClr>
+              <a:buSzPts val="2000"/>
+              <a:buFont typeface="Nunito"/>
+              <a:buNone/>
+              <a:defRPr sz="2000" b="1" i="0" u="none" strike="noStrike" cap="none">
+                <a:solidFill>
+                  <a:srgbClr val="FFF9D9"/>
+                </a:solidFill>
+                <a:latin typeface="Nunito"/>
+                <a:ea typeface="Nunito"/>
+                <a:cs typeface="Nunito"/>
+                <a:sym typeface="Nunito"/>
+              </a:defRPr>
+            </a:lvl6pPr>
+            <a:lvl7pPr marR="0" lvl="6" algn="l" rtl="0">
+              <a:lnSpc>
+                <a:spcPct val="100000"/>
+              </a:lnSpc>
+              <a:spcBef>
+                <a:spcPts val="0"/>
+              </a:spcBef>
+              <a:spcAft>
+                <a:spcPts val="0"/>
+              </a:spcAft>
+              <a:buClr>
+                <a:srgbClr val="FFF9D9"/>
+              </a:buClr>
+              <a:buSzPts val="2000"/>
+              <a:buFont typeface="Nunito"/>
+              <a:buNone/>
+              <a:defRPr sz="2000" b="1" i="0" u="none" strike="noStrike" cap="none">
+                <a:solidFill>
+                  <a:srgbClr val="FFF9D9"/>
+                </a:solidFill>
+                <a:latin typeface="Nunito"/>
+                <a:ea typeface="Nunito"/>
+                <a:cs typeface="Nunito"/>
+                <a:sym typeface="Nunito"/>
+              </a:defRPr>
+            </a:lvl7pPr>
+            <a:lvl8pPr marR="0" lvl="7" algn="l" rtl="0">
+              <a:lnSpc>
+                <a:spcPct val="100000"/>
+              </a:lnSpc>
+              <a:spcBef>
+                <a:spcPts val="0"/>
+              </a:spcBef>
+              <a:spcAft>
+                <a:spcPts val="0"/>
+              </a:spcAft>
+              <a:buClr>
+                <a:srgbClr val="FFF9D9"/>
+              </a:buClr>
+              <a:buSzPts val="2000"/>
+              <a:buFont typeface="Nunito"/>
+              <a:buNone/>
+              <a:defRPr sz="2000" b="1" i="0" u="none" strike="noStrike" cap="none">
+                <a:solidFill>
+                  <a:srgbClr val="FFF9D9"/>
+                </a:solidFill>
+                <a:latin typeface="Nunito"/>
+                <a:ea typeface="Nunito"/>
+                <a:cs typeface="Nunito"/>
+                <a:sym typeface="Nunito"/>
+              </a:defRPr>
+            </a:lvl8pPr>
+            <a:lvl9pPr marR="0" lvl="8" algn="l" rtl="0">
+              <a:lnSpc>
+                <a:spcPct val="100000"/>
+              </a:lnSpc>
+              <a:spcBef>
+                <a:spcPts val="0"/>
+              </a:spcBef>
+              <a:spcAft>
+                <a:spcPts val="0"/>
+              </a:spcAft>
+              <a:buClr>
+                <a:srgbClr val="FFF9D9"/>
+              </a:buClr>
+              <a:buSzPts val="2000"/>
+              <a:buFont typeface="Nunito"/>
+              <a:buNone/>
+              <a:defRPr sz="2000" b="1" i="0" u="none" strike="noStrike" cap="none">
+                <a:solidFill>
+                  <a:srgbClr val="FFF9D9"/>
+                </a:solidFill>
+                <a:latin typeface="Nunito"/>
+                <a:ea typeface="Nunito"/>
+                <a:cs typeface="Nunito"/>
+                <a:sym typeface="Nunito"/>
+              </a:defRPr>
+            </a:lvl9pPr>
+          </a:lstStyle>
+          <a:p>
+            <a:pPr algn="ctr">
+              <a:lnSpc>
+                <a:spcPct val="150000"/>
+              </a:lnSpc>
+            </a:pPr>
+            <a:r>
+              <a:rPr lang="pt-BR" sz="1400" dirty="0">
+                <a:solidFill>
+                  <a:srgbClr val="CC8A42"/>
+                </a:solidFill>
+              </a:rPr>
+              <a:t>{{</a:t>
+            </a:r>
+            <a:r>
+              <a:rPr lang="pt-BR" sz="1400" dirty="0" err="1">
+                <a:solidFill>
+                  <a:srgbClr val="CC8A42"/>
+                </a:solidFill>
+              </a:rPr>
+              <a:t>nota_lider</a:t>
+            </a:r>
+            <a:r>
+              <a:rPr lang="pt-BR" sz="1400" dirty="0">
+                <a:solidFill>
+                  <a:srgbClr val="CC8A42"/>
+                </a:solidFill>
+              </a:rPr>
+              <a:t>}}</a:t>
+            </a:r>
+            <a:endParaRPr lang="pt-BR" dirty="0">
+              <a:solidFill>
+                <a:srgbClr val="CC8A42"/>
+              </a:solidFill>
+            </a:endParaRPr>
+          </a:p>
+        </p:txBody>
+      </p:sp>
+      <p:sp>
+        <p:nvSpPr>
+          <p:cNvPr id="8" name="Google Shape;494;p69">
+            <a:extLst>
+              <a:ext uri="{FF2B5EF4-FFF2-40B4-BE49-F238E27FC236}">
+                <a16:creationId xmlns:a16="http://schemas.microsoft.com/office/drawing/2014/main" id="{569F0DF1-BA32-E45E-4FC3-1235D790B963}"/>
+              </a:ext>
+            </a:extLst>
+          </p:cNvPr>
+          <p:cNvSpPr txBox="1">
+            <a:spLocks/>
+          </p:cNvSpPr>
+          <p:nvPr/>
+        </p:nvSpPr>
+        <p:spPr>
+          <a:xfrm>
+            <a:off x="6808577" y="1330036"/>
+            <a:ext cx="2005652" cy="528768"/>
+          </a:xfrm>
+          <a:prstGeom prst="rect">
+            <a:avLst/>
+          </a:prstGeom>
+          <a:noFill/>
+          <a:ln>
+            <a:noFill/>
+          </a:ln>
+        </p:spPr>
+        <p:txBody>
+          <a:bodyPr spcFirstLastPara="1" wrap="square" lIns="91425" tIns="91425" rIns="91425" bIns="91425" anchor="t" anchorCtr="0">
+            <a:normAutofit/>
+          </a:bodyPr>
+          <a:lstStyle>
+            <a:defPPr marR="0" lvl="0" algn="l" rtl="0">
+              <a:lnSpc>
+                <a:spcPct val="100000"/>
+              </a:lnSpc>
+              <a:spcBef>
+                <a:spcPts val="0"/>
+              </a:spcBef>
+              <a:spcAft>
+                <a:spcPts val="0"/>
+              </a:spcAft>
+            </a:defPPr>
+            <a:lvl1pPr marR="0" lvl="0" algn="l" rtl="0">
+              <a:lnSpc>
+                <a:spcPct val="100000"/>
+              </a:lnSpc>
+              <a:spcBef>
+                <a:spcPts val="0"/>
+              </a:spcBef>
+              <a:spcAft>
+                <a:spcPts val="0"/>
+              </a:spcAft>
+              <a:buClr>
+                <a:schemeClr val="lt1"/>
+              </a:buClr>
+              <a:buSzPts val="2000"/>
+              <a:buFont typeface="Nunito"/>
+              <a:buNone/>
+              <a:defRPr sz="2000" b="1" i="0" u="none" strike="noStrike" cap="none">
+                <a:solidFill>
+                  <a:schemeClr val="lt1"/>
+                </a:solidFill>
+                <a:latin typeface="Nunito"/>
+                <a:ea typeface="Nunito"/>
+                <a:cs typeface="Nunito"/>
+                <a:sym typeface="Nunito"/>
+              </a:defRPr>
+            </a:lvl1pPr>
+            <a:lvl2pPr marR="0" lvl="1" algn="l" rtl="0">
+              <a:lnSpc>
+                <a:spcPct val="100000"/>
+              </a:lnSpc>
+              <a:spcBef>
+                <a:spcPts val="0"/>
+              </a:spcBef>
+              <a:spcAft>
+                <a:spcPts val="0"/>
+              </a:spcAft>
+              <a:buClr>
+                <a:srgbClr val="FFF9D9"/>
+              </a:buClr>
+              <a:buSzPts val="2000"/>
+              <a:buFont typeface="Nunito"/>
+              <a:buNone/>
+              <a:defRPr sz="2000" b="1" i="0" u="none" strike="noStrike" cap="none">
+                <a:solidFill>
+                  <a:srgbClr val="FFF9D9"/>
+                </a:solidFill>
+                <a:latin typeface="Nunito"/>
+                <a:ea typeface="Nunito"/>
+                <a:cs typeface="Nunito"/>
+                <a:sym typeface="Nunito"/>
+              </a:defRPr>
+            </a:lvl2pPr>
+            <a:lvl3pPr marR="0" lvl="2" algn="l" rtl="0">
+              <a:lnSpc>
+                <a:spcPct val="100000"/>
+              </a:lnSpc>
+              <a:spcBef>
+                <a:spcPts val="0"/>
+              </a:spcBef>
+              <a:spcAft>
+                <a:spcPts val="0"/>
+              </a:spcAft>
+              <a:buClr>
+                <a:srgbClr val="FFF9D9"/>
+              </a:buClr>
+              <a:buSzPts val="2000"/>
+              <a:buFont typeface="Nunito"/>
+              <a:buNone/>
+              <a:defRPr sz="2000" b="1" i="0" u="none" strike="noStrike" cap="none">
+                <a:solidFill>
+                  <a:srgbClr val="FFF9D9"/>
+                </a:solidFill>
+                <a:latin typeface="Nunito"/>
+                <a:ea typeface="Nunito"/>
+                <a:cs typeface="Nunito"/>
+                <a:sym typeface="Nunito"/>
+              </a:defRPr>
+            </a:lvl3pPr>
+            <a:lvl4pPr marR="0" lvl="3" algn="l" rtl="0">
+              <a:lnSpc>
+                <a:spcPct val="100000"/>
+              </a:lnSpc>
+              <a:spcBef>
+                <a:spcPts val="0"/>
+              </a:spcBef>
+              <a:spcAft>
+                <a:spcPts val="0"/>
+              </a:spcAft>
+              <a:buClr>
+                <a:srgbClr val="FFF9D9"/>
+              </a:buClr>
+              <a:buSzPts val="2000"/>
+              <a:buFont typeface="Nunito"/>
+              <a:buNone/>
+              <a:defRPr sz="2000" b="1" i="0" u="none" strike="noStrike" cap="none">
+                <a:solidFill>
+                  <a:srgbClr val="FFF9D9"/>
+                </a:solidFill>
+                <a:latin typeface="Nunito"/>
+                <a:ea typeface="Nunito"/>
+                <a:cs typeface="Nunito"/>
+                <a:sym typeface="Nunito"/>
+              </a:defRPr>
+            </a:lvl4pPr>
+            <a:lvl5pPr marR="0" lvl="4" algn="l" rtl="0">
+              <a:lnSpc>
+                <a:spcPct val="100000"/>
+              </a:lnSpc>
+              <a:spcBef>
+                <a:spcPts val="0"/>
+              </a:spcBef>
+              <a:spcAft>
+                <a:spcPts val="0"/>
+              </a:spcAft>
+              <a:buClr>
+                <a:srgbClr val="FFF9D9"/>
+              </a:buClr>
+              <a:buSzPts val="2000"/>
+              <a:buFont typeface="Nunito"/>
+              <a:buNone/>
+              <a:defRPr sz="2000" b="1" i="0" u="none" strike="noStrike" cap="none">
+                <a:solidFill>
+                  <a:srgbClr val="FFF9D9"/>
+                </a:solidFill>
+                <a:latin typeface="Nunito"/>
+                <a:ea typeface="Nunito"/>
+                <a:cs typeface="Nunito"/>
+                <a:sym typeface="Nunito"/>
+              </a:defRPr>
+            </a:lvl5pPr>
+            <a:lvl6pPr marR="0" lvl="5" algn="l" rtl="0">
+              <a:lnSpc>
+                <a:spcPct val="100000"/>
+              </a:lnSpc>
+              <a:spcBef>
+                <a:spcPts val="0"/>
+              </a:spcBef>
+              <a:spcAft>
+                <a:spcPts val="0"/>
+              </a:spcAft>
+              <a:buClr>
+                <a:srgbClr val="FFF9D9"/>
+              </a:buClr>
+              <a:buSzPts val="2000"/>
+              <a:buFont typeface="Nunito"/>
+              <a:buNone/>
+              <a:defRPr sz="2000" b="1" i="0" u="none" strike="noStrike" cap="none">
+                <a:solidFill>
+                  <a:srgbClr val="FFF9D9"/>
+                </a:solidFill>
+                <a:latin typeface="Nunito"/>
+                <a:ea typeface="Nunito"/>
+                <a:cs typeface="Nunito"/>
+                <a:sym typeface="Nunito"/>
+              </a:defRPr>
+            </a:lvl6pPr>
+            <a:lvl7pPr marR="0" lvl="6" algn="l" rtl="0">
+              <a:lnSpc>
+                <a:spcPct val="100000"/>
+              </a:lnSpc>
+              <a:spcBef>
+                <a:spcPts val="0"/>
+              </a:spcBef>
+              <a:spcAft>
+                <a:spcPts val="0"/>
+              </a:spcAft>
+              <a:buClr>
+                <a:srgbClr val="FFF9D9"/>
+              </a:buClr>
+              <a:buSzPts val="2000"/>
+              <a:buFont typeface="Nunito"/>
+              <a:buNone/>
+              <a:defRPr sz="2000" b="1" i="0" u="none" strike="noStrike" cap="none">
+                <a:solidFill>
+                  <a:srgbClr val="FFF9D9"/>
+                </a:solidFill>
+                <a:latin typeface="Nunito"/>
+                <a:ea typeface="Nunito"/>
+                <a:cs typeface="Nunito"/>
+                <a:sym typeface="Nunito"/>
+              </a:defRPr>
+            </a:lvl7pPr>
+            <a:lvl8pPr marR="0" lvl="7" algn="l" rtl="0">
+              <a:lnSpc>
+                <a:spcPct val="100000"/>
+              </a:lnSpc>
+              <a:spcBef>
+                <a:spcPts val="0"/>
+              </a:spcBef>
+              <a:spcAft>
+                <a:spcPts val="0"/>
+              </a:spcAft>
+              <a:buClr>
+                <a:srgbClr val="FFF9D9"/>
+              </a:buClr>
+              <a:buSzPts val="2000"/>
+              <a:buFont typeface="Nunito"/>
+              <a:buNone/>
+              <a:defRPr sz="2000" b="1" i="0" u="none" strike="noStrike" cap="none">
+                <a:solidFill>
+                  <a:srgbClr val="FFF9D9"/>
+                </a:solidFill>
+                <a:latin typeface="Nunito"/>
+                <a:ea typeface="Nunito"/>
+                <a:cs typeface="Nunito"/>
+                <a:sym typeface="Nunito"/>
+              </a:defRPr>
+            </a:lvl8pPr>
+            <a:lvl9pPr marR="0" lvl="8" algn="l" rtl="0">
+              <a:lnSpc>
+                <a:spcPct val="100000"/>
+              </a:lnSpc>
+              <a:spcBef>
+                <a:spcPts val="0"/>
+              </a:spcBef>
+              <a:spcAft>
+                <a:spcPts val="0"/>
+              </a:spcAft>
+              <a:buClr>
+                <a:srgbClr val="FFF9D9"/>
+              </a:buClr>
+              <a:buSzPts val="2000"/>
+              <a:buFont typeface="Nunito"/>
+              <a:buNone/>
+              <a:defRPr sz="2000" b="1" i="0" u="none" strike="noStrike" cap="none">
+                <a:solidFill>
+                  <a:srgbClr val="FFF9D9"/>
+                </a:solidFill>
+                <a:latin typeface="Nunito"/>
+                <a:ea typeface="Nunito"/>
+                <a:cs typeface="Nunito"/>
+                <a:sym typeface="Nunito"/>
+              </a:defRPr>
+            </a:lvl9pPr>
+          </a:lstStyle>
+          <a:p>
+            <a:pPr algn="ctr">
+              <a:lnSpc>
+                <a:spcPct val="150000"/>
+              </a:lnSpc>
+            </a:pPr>
+            <a:r>
+              <a:rPr lang="pt-BR" sz="1400" dirty="0">
+                <a:solidFill>
+                  <a:srgbClr val="CC8A42"/>
+                </a:solidFill>
+              </a:rPr>
+              <a:t>{{</a:t>
+            </a:r>
+            <a:r>
+              <a:rPr lang="pt-BR" sz="1400" dirty="0" err="1">
+                <a:solidFill>
+                  <a:srgbClr val="CC8A42"/>
+                </a:solidFill>
+              </a:rPr>
+              <a:t>nota_liderado</a:t>
             </a:r>
             <a:r>
               <a:rPr lang="pt-BR" sz="1400" dirty="0">
@@ -24677,42 +25517,6 @@
               <a:t>Autoavaliação</a:t>
             </a:r>
           </a:p>
-          <a:p>
-            <a:pPr algn="ctr">
-              <a:lnSpc>
-                <a:spcPct val="150000"/>
-              </a:lnSpc>
-            </a:pPr>
-            <a:r>
-              <a:rPr lang="pt-BR" sz="1400" dirty="0">
-                <a:solidFill>
-                  <a:srgbClr val="CC8A42"/>
-                </a:solidFill>
-              </a:rPr>
-              <a:t>{{</a:t>
-            </a:r>
-            <a:r>
-              <a:rPr lang="pt-BR" sz="1400" dirty="0" err="1">
-                <a:solidFill>
-                  <a:srgbClr val="CC8A42"/>
-                </a:solidFill>
-              </a:rPr>
-              <a:t>nota_lider_auto</a:t>
-            </a:r>
-            <a:r>
-              <a:rPr lang="pt-BR" sz="1400" dirty="0">
-                <a:solidFill>
-                  <a:srgbClr val="CC8A42"/>
-                </a:solidFill>
-              </a:rPr>
-              <a:t>}}</a:t>
-            </a:r>
-            <a:endParaRPr lang="pt-BR" dirty="0">
-              <a:solidFill>
-                <a:srgbClr val="CC8A42"/>
-              </a:solidFill>
-            </a:endParaRPr>
-          </a:p>
         </p:txBody>
       </p:sp>
       <p:sp>
@@ -25004,42 +25808,6 @@
               <a:t>Avaliação dos Líderes</a:t>
             </a:r>
           </a:p>
-          <a:p>
-            <a:pPr algn="ctr">
-              <a:lnSpc>
-                <a:spcPct val="150000"/>
-              </a:lnSpc>
-            </a:pPr>
-            <a:r>
-              <a:rPr lang="pt-BR" sz="1400" dirty="0">
-                <a:solidFill>
-                  <a:srgbClr val="CC8A42"/>
-                </a:solidFill>
-              </a:rPr>
-              <a:t>{{</a:t>
-            </a:r>
-            <a:r>
-              <a:rPr lang="pt-BR" sz="1400" dirty="0" err="1">
-                <a:solidFill>
-                  <a:srgbClr val="CC8A42"/>
-                </a:solidFill>
-              </a:rPr>
-              <a:t>nota_lider_lider</a:t>
-            </a:r>
-            <a:r>
-              <a:rPr lang="pt-BR" sz="1400" dirty="0">
-                <a:solidFill>
-                  <a:srgbClr val="CC8A42"/>
-                </a:solidFill>
-              </a:rPr>
-              <a:t>}}</a:t>
-            </a:r>
-            <a:endParaRPr lang="pt-BR" dirty="0">
-              <a:solidFill>
-                <a:srgbClr val="CC8A42"/>
-              </a:solidFill>
-            </a:endParaRPr>
-          </a:p>
         </p:txBody>
       </p:sp>
       <p:sp>
@@ -25059,7 +25827,7 @@
         <p:spPr>
           <a:xfrm>
             <a:off x="6697276" y="995685"/>
-            <a:ext cx="2228255" cy="863119"/>
+            <a:ext cx="2228255" cy="528767"/>
           </a:xfrm>
           <a:prstGeom prst="rect">
             <a:avLst/>
@@ -25330,42 +26098,6 @@
               </a:rPr>
               <a:t>Avaliação dos Liderados</a:t>
             </a:r>
-          </a:p>
-          <a:p>
-            <a:pPr algn="ctr">
-              <a:lnSpc>
-                <a:spcPct val="150000"/>
-              </a:lnSpc>
-            </a:pPr>
-            <a:r>
-              <a:rPr lang="pt-BR" sz="1400" dirty="0">
-                <a:solidFill>
-                  <a:srgbClr val="CC8A42"/>
-                </a:solidFill>
-              </a:rPr>
-              <a:t>{{</a:t>
-            </a:r>
-            <a:r>
-              <a:rPr lang="pt-BR" sz="1400" dirty="0" err="1">
-                <a:solidFill>
-                  <a:srgbClr val="CC8A42"/>
-                </a:solidFill>
-              </a:rPr>
-              <a:t>nota_lider_liderado</a:t>
-            </a:r>
-            <a:r>
-              <a:rPr lang="pt-BR" sz="1400" dirty="0">
-                <a:solidFill>
-                  <a:srgbClr val="CC8A42"/>
-                </a:solidFill>
-              </a:rPr>
-              <a:t>}}</a:t>
-            </a:r>
-            <a:endParaRPr lang="pt-BR" dirty="0">
-              <a:solidFill>
-                <a:srgbClr val="CC8A42"/>
-              </a:solidFill>
-            </a:endParaRPr>
           </a:p>
         </p:txBody>
       </p:sp>
@@ -25664,6 +26396,954 @@
                 </a:solidFill>
               </a:rPr>
               <a:t>radar_geral</a:t>
+            </a:r>
+            <a:r>
+              <a:rPr lang="pt-BR" sz="1400" dirty="0">
+                <a:solidFill>
+                  <a:srgbClr val="CC8A42"/>
+                </a:solidFill>
+              </a:rPr>
+              <a:t>}}</a:t>
+            </a:r>
+            <a:endParaRPr lang="pt-BR" dirty="0">
+              <a:solidFill>
+                <a:srgbClr val="CC8A42"/>
+              </a:solidFill>
+            </a:endParaRPr>
+          </a:p>
+        </p:txBody>
+      </p:sp>
+      <p:sp>
+        <p:nvSpPr>
+          <p:cNvPr id="7" name="Google Shape;494;p69">
+            <a:extLst>
+              <a:ext uri="{FF2B5EF4-FFF2-40B4-BE49-F238E27FC236}">
+                <a16:creationId xmlns:a16="http://schemas.microsoft.com/office/drawing/2014/main" id="{0AA09AA7-2986-7A0E-41DB-C206555C6777}"/>
+              </a:ext>
+            </a:extLst>
+          </p:cNvPr>
+          <p:cNvSpPr txBox="1">
+            <a:spLocks/>
+          </p:cNvSpPr>
+          <p:nvPr/>
+        </p:nvSpPr>
+        <p:spPr>
+          <a:xfrm>
+            <a:off x="2657565" y="1366989"/>
+            <a:ext cx="2005652" cy="528768"/>
+          </a:xfrm>
+          <a:prstGeom prst="rect">
+            <a:avLst/>
+          </a:prstGeom>
+          <a:noFill/>
+          <a:ln>
+            <a:noFill/>
+          </a:ln>
+        </p:spPr>
+        <p:txBody>
+          <a:bodyPr spcFirstLastPara="1" wrap="square" lIns="91425" tIns="91425" rIns="91425" bIns="91425" anchor="t" anchorCtr="0">
+            <a:normAutofit/>
+          </a:bodyPr>
+          <a:lstStyle>
+            <a:defPPr marR="0" lvl="0" algn="l" rtl="0">
+              <a:lnSpc>
+                <a:spcPct val="100000"/>
+              </a:lnSpc>
+              <a:spcBef>
+                <a:spcPts val="0"/>
+              </a:spcBef>
+              <a:spcAft>
+                <a:spcPts val="0"/>
+              </a:spcAft>
+            </a:defPPr>
+            <a:lvl1pPr marR="0" lvl="0" algn="l" rtl="0">
+              <a:lnSpc>
+                <a:spcPct val="100000"/>
+              </a:lnSpc>
+              <a:spcBef>
+                <a:spcPts val="0"/>
+              </a:spcBef>
+              <a:spcAft>
+                <a:spcPts val="0"/>
+              </a:spcAft>
+              <a:buClr>
+                <a:schemeClr val="lt1"/>
+              </a:buClr>
+              <a:buSzPts val="2000"/>
+              <a:buFont typeface="Nunito"/>
+              <a:buNone/>
+              <a:defRPr sz="2000" b="1" i="0" u="none" strike="noStrike" cap="none">
+                <a:solidFill>
+                  <a:schemeClr val="lt1"/>
+                </a:solidFill>
+                <a:latin typeface="Nunito"/>
+                <a:ea typeface="Nunito"/>
+                <a:cs typeface="Nunito"/>
+                <a:sym typeface="Nunito"/>
+              </a:defRPr>
+            </a:lvl1pPr>
+            <a:lvl2pPr marR="0" lvl="1" algn="l" rtl="0">
+              <a:lnSpc>
+                <a:spcPct val="100000"/>
+              </a:lnSpc>
+              <a:spcBef>
+                <a:spcPts val="0"/>
+              </a:spcBef>
+              <a:spcAft>
+                <a:spcPts val="0"/>
+              </a:spcAft>
+              <a:buClr>
+                <a:srgbClr val="FFF9D9"/>
+              </a:buClr>
+              <a:buSzPts val="2000"/>
+              <a:buFont typeface="Nunito"/>
+              <a:buNone/>
+              <a:defRPr sz="2000" b="1" i="0" u="none" strike="noStrike" cap="none">
+                <a:solidFill>
+                  <a:srgbClr val="FFF9D9"/>
+                </a:solidFill>
+                <a:latin typeface="Nunito"/>
+                <a:ea typeface="Nunito"/>
+                <a:cs typeface="Nunito"/>
+                <a:sym typeface="Nunito"/>
+              </a:defRPr>
+            </a:lvl2pPr>
+            <a:lvl3pPr marR="0" lvl="2" algn="l" rtl="0">
+              <a:lnSpc>
+                <a:spcPct val="100000"/>
+              </a:lnSpc>
+              <a:spcBef>
+                <a:spcPts val="0"/>
+              </a:spcBef>
+              <a:spcAft>
+                <a:spcPts val="0"/>
+              </a:spcAft>
+              <a:buClr>
+                <a:srgbClr val="FFF9D9"/>
+              </a:buClr>
+              <a:buSzPts val="2000"/>
+              <a:buFont typeface="Nunito"/>
+              <a:buNone/>
+              <a:defRPr sz="2000" b="1" i="0" u="none" strike="noStrike" cap="none">
+                <a:solidFill>
+                  <a:srgbClr val="FFF9D9"/>
+                </a:solidFill>
+                <a:latin typeface="Nunito"/>
+                <a:ea typeface="Nunito"/>
+                <a:cs typeface="Nunito"/>
+                <a:sym typeface="Nunito"/>
+              </a:defRPr>
+            </a:lvl3pPr>
+            <a:lvl4pPr marR="0" lvl="3" algn="l" rtl="0">
+              <a:lnSpc>
+                <a:spcPct val="100000"/>
+              </a:lnSpc>
+              <a:spcBef>
+                <a:spcPts val="0"/>
+              </a:spcBef>
+              <a:spcAft>
+                <a:spcPts val="0"/>
+              </a:spcAft>
+              <a:buClr>
+                <a:srgbClr val="FFF9D9"/>
+              </a:buClr>
+              <a:buSzPts val="2000"/>
+              <a:buFont typeface="Nunito"/>
+              <a:buNone/>
+              <a:defRPr sz="2000" b="1" i="0" u="none" strike="noStrike" cap="none">
+                <a:solidFill>
+                  <a:srgbClr val="FFF9D9"/>
+                </a:solidFill>
+                <a:latin typeface="Nunito"/>
+                <a:ea typeface="Nunito"/>
+                <a:cs typeface="Nunito"/>
+                <a:sym typeface="Nunito"/>
+              </a:defRPr>
+            </a:lvl4pPr>
+            <a:lvl5pPr marR="0" lvl="4" algn="l" rtl="0">
+              <a:lnSpc>
+                <a:spcPct val="100000"/>
+              </a:lnSpc>
+              <a:spcBef>
+                <a:spcPts val="0"/>
+              </a:spcBef>
+              <a:spcAft>
+                <a:spcPts val="0"/>
+              </a:spcAft>
+              <a:buClr>
+                <a:srgbClr val="FFF9D9"/>
+              </a:buClr>
+              <a:buSzPts val="2000"/>
+              <a:buFont typeface="Nunito"/>
+              <a:buNone/>
+              <a:defRPr sz="2000" b="1" i="0" u="none" strike="noStrike" cap="none">
+                <a:solidFill>
+                  <a:srgbClr val="FFF9D9"/>
+                </a:solidFill>
+                <a:latin typeface="Nunito"/>
+                <a:ea typeface="Nunito"/>
+                <a:cs typeface="Nunito"/>
+                <a:sym typeface="Nunito"/>
+              </a:defRPr>
+            </a:lvl5pPr>
+            <a:lvl6pPr marR="0" lvl="5" algn="l" rtl="0">
+              <a:lnSpc>
+                <a:spcPct val="100000"/>
+              </a:lnSpc>
+              <a:spcBef>
+                <a:spcPts val="0"/>
+              </a:spcBef>
+              <a:spcAft>
+                <a:spcPts val="0"/>
+              </a:spcAft>
+              <a:buClr>
+                <a:srgbClr val="FFF9D9"/>
+              </a:buClr>
+              <a:buSzPts val="2000"/>
+              <a:buFont typeface="Nunito"/>
+              <a:buNone/>
+              <a:defRPr sz="2000" b="1" i="0" u="none" strike="noStrike" cap="none">
+                <a:solidFill>
+                  <a:srgbClr val="FFF9D9"/>
+                </a:solidFill>
+                <a:latin typeface="Nunito"/>
+                <a:ea typeface="Nunito"/>
+                <a:cs typeface="Nunito"/>
+                <a:sym typeface="Nunito"/>
+              </a:defRPr>
+            </a:lvl6pPr>
+            <a:lvl7pPr marR="0" lvl="6" algn="l" rtl="0">
+              <a:lnSpc>
+                <a:spcPct val="100000"/>
+              </a:lnSpc>
+              <a:spcBef>
+                <a:spcPts val="0"/>
+              </a:spcBef>
+              <a:spcAft>
+                <a:spcPts val="0"/>
+              </a:spcAft>
+              <a:buClr>
+                <a:srgbClr val="FFF9D9"/>
+              </a:buClr>
+              <a:buSzPts val="2000"/>
+              <a:buFont typeface="Nunito"/>
+              <a:buNone/>
+              <a:defRPr sz="2000" b="1" i="0" u="none" strike="noStrike" cap="none">
+                <a:solidFill>
+                  <a:srgbClr val="FFF9D9"/>
+                </a:solidFill>
+                <a:latin typeface="Nunito"/>
+                <a:ea typeface="Nunito"/>
+                <a:cs typeface="Nunito"/>
+                <a:sym typeface="Nunito"/>
+              </a:defRPr>
+            </a:lvl7pPr>
+            <a:lvl8pPr marR="0" lvl="7" algn="l" rtl="0">
+              <a:lnSpc>
+                <a:spcPct val="100000"/>
+              </a:lnSpc>
+              <a:spcBef>
+                <a:spcPts val="0"/>
+              </a:spcBef>
+              <a:spcAft>
+                <a:spcPts val="0"/>
+              </a:spcAft>
+              <a:buClr>
+                <a:srgbClr val="FFF9D9"/>
+              </a:buClr>
+              <a:buSzPts val="2000"/>
+              <a:buFont typeface="Nunito"/>
+              <a:buNone/>
+              <a:defRPr sz="2000" b="1" i="0" u="none" strike="noStrike" cap="none">
+                <a:solidFill>
+                  <a:srgbClr val="FFF9D9"/>
+                </a:solidFill>
+                <a:latin typeface="Nunito"/>
+                <a:ea typeface="Nunito"/>
+                <a:cs typeface="Nunito"/>
+                <a:sym typeface="Nunito"/>
+              </a:defRPr>
+            </a:lvl8pPr>
+            <a:lvl9pPr marR="0" lvl="8" algn="l" rtl="0">
+              <a:lnSpc>
+                <a:spcPct val="100000"/>
+              </a:lnSpc>
+              <a:spcBef>
+                <a:spcPts val="0"/>
+              </a:spcBef>
+              <a:spcAft>
+                <a:spcPts val="0"/>
+              </a:spcAft>
+              <a:buClr>
+                <a:srgbClr val="FFF9D9"/>
+              </a:buClr>
+              <a:buSzPts val="2000"/>
+              <a:buFont typeface="Nunito"/>
+              <a:buNone/>
+              <a:defRPr sz="2000" b="1" i="0" u="none" strike="noStrike" cap="none">
+                <a:solidFill>
+                  <a:srgbClr val="FFF9D9"/>
+                </a:solidFill>
+                <a:latin typeface="Nunito"/>
+                <a:ea typeface="Nunito"/>
+                <a:cs typeface="Nunito"/>
+                <a:sym typeface="Nunito"/>
+              </a:defRPr>
+            </a:lvl9pPr>
+          </a:lstStyle>
+          <a:p>
+            <a:pPr algn="ctr">
+              <a:lnSpc>
+                <a:spcPct val="150000"/>
+              </a:lnSpc>
+            </a:pPr>
+            <a:r>
+              <a:rPr lang="pt-BR" sz="1400" dirty="0">
+                <a:solidFill>
+                  <a:srgbClr val="CC8A42"/>
+                </a:solidFill>
+              </a:rPr>
+              <a:t>{{</a:t>
+            </a:r>
+            <a:r>
+              <a:rPr lang="pt-BR" sz="1400" dirty="0" err="1">
+                <a:solidFill>
+                  <a:srgbClr val="CC8A42"/>
+                </a:solidFill>
+              </a:rPr>
+              <a:t>nota_lider_auto</a:t>
+            </a:r>
+            <a:r>
+              <a:rPr lang="pt-BR" sz="1400" dirty="0">
+                <a:solidFill>
+                  <a:srgbClr val="CC8A42"/>
+                </a:solidFill>
+              </a:rPr>
+              <a:t>}}</a:t>
+            </a:r>
+            <a:endParaRPr lang="pt-BR" dirty="0">
+              <a:solidFill>
+                <a:srgbClr val="CC8A42"/>
+              </a:solidFill>
+            </a:endParaRPr>
+          </a:p>
+        </p:txBody>
+      </p:sp>
+      <p:sp>
+        <p:nvSpPr>
+          <p:cNvPr id="8" name="Google Shape;494;p69">
+            <a:extLst>
+              <a:ext uri="{FF2B5EF4-FFF2-40B4-BE49-F238E27FC236}">
+                <a16:creationId xmlns:a16="http://schemas.microsoft.com/office/drawing/2014/main" id="{170E24E1-93AE-63DB-CA7C-98ED3429E8EC}"/>
+              </a:ext>
+            </a:extLst>
+          </p:cNvPr>
+          <p:cNvSpPr txBox="1">
+            <a:spLocks/>
+          </p:cNvSpPr>
+          <p:nvPr/>
+        </p:nvSpPr>
+        <p:spPr>
+          <a:xfrm>
+            <a:off x="4663217" y="1366989"/>
+            <a:ext cx="2005652" cy="528768"/>
+          </a:xfrm>
+          <a:prstGeom prst="rect">
+            <a:avLst/>
+          </a:prstGeom>
+          <a:noFill/>
+          <a:ln>
+            <a:noFill/>
+          </a:ln>
+        </p:spPr>
+        <p:txBody>
+          <a:bodyPr spcFirstLastPara="1" wrap="square" lIns="91425" tIns="91425" rIns="91425" bIns="91425" anchor="t" anchorCtr="0">
+            <a:normAutofit/>
+          </a:bodyPr>
+          <a:lstStyle>
+            <a:defPPr marR="0" lvl="0" algn="l" rtl="0">
+              <a:lnSpc>
+                <a:spcPct val="100000"/>
+              </a:lnSpc>
+              <a:spcBef>
+                <a:spcPts val="0"/>
+              </a:spcBef>
+              <a:spcAft>
+                <a:spcPts val="0"/>
+              </a:spcAft>
+            </a:defPPr>
+            <a:lvl1pPr marR="0" lvl="0" algn="l" rtl="0">
+              <a:lnSpc>
+                <a:spcPct val="100000"/>
+              </a:lnSpc>
+              <a:spcBef>
+                <a:spcPts val="0"/>
+              </a:spcBef>
+              <a:spcAft>
+                <a:spcPts val="0"/>
+              </a:spcAft>
+              <a:buClr>
+                <a:schemeClr val="lt1"/>
+              </a:buClr>
+              <a:buSzPts val="2000"/>
+              <a:buFont typeface="Nunito"/>
+              <a:buNone/>
+              <a:defRPr sz="2000" b="1" i="0" u="none" strike="noStrike" cap="none">
+                <a:solidFill>
+                  <a:schemeClr val="lt1"/>
+                </a:solidFill>
+                <a:latin typeface="Nunito"/>
+                <a:ea typeface="Nunito"/>
+                <a:cs typeface="Nunito"/>
+                <a:sym typeface="Nunito"/>
+              </a:defRPr>
+            </a:lvl1pPr>
+            <a:lvl2pPr marR="0" lvl="1" algn="l" rtl="0">
+              <a:lnSpc>
+                <a:spcPct val="100000"/>
+              </a:lnSpc>
+              <a:spcBef>
+                <a:spcPts val="0"/>
+              </a:spcBef>
+              <a:spcAft>
+                <a:spcPts val="0"/>
+              </a:spcAft>
+              <a:buClr>
+                <a:srgbClr val="FFF9D9"/>
+              </a:buClr>
+              <a:buSzPts val="2000"/>
+              <a:buFont typeface="Nunito"/>
+              <a:buNone/>
+              <a:defRPr sz="2000" b="1" i="0" u="none" strike="noStrike" cap="none">
+                <a:solidFill>
+                  <a:srgbClr val="FFF9D9"/>
+                </a:solidFill>
+                <a:latin typeface="Nunito"/>
+                <a:ea typeface="Nunito"/>
+                <a:cs typeface="Nunito"/>
+                <a:sym typeface="Nunito"/>
+              </a:defRPr>
+            </a:lvl2pPr>
+            <a:lvl3pPr marR="0" lvl="2" algn="l" rtl="0">
+              <a:lnSpc>
+                <a:spcPct val="100000"/>
+              </a:lnSpc>
+              <a:spcBef>
+                <a:spcPts val="0"/>
+              </a:spcBef>
+              <a:spcAft>
+                <a:spcPts val="0"/>
+              </a:spcAft>
+              <a:buClr>
+                <a:srgbClr val="FFF9D9"/>
+              </a:buClr>
+              <a:buSzPts val="2000"/>
+              <a:buFont typeface="Nunito"/>
+              <a:buNone/>
+              <a:defRPr sz="2000" b="1" i="0" u="none" strike="noStrike" cap="none">
+                <a:solidFill>
+                  <a:srgbClr val="FFF9D9"/>
+                </a:solidFill>
+                <a:latin typeface="Nunito"/>
+                <a:ea typeface="Nunito"/>
+                <a:cs typeface="Nunito"/>
+                <a:sym typeface="Nunito"/>
+              </a:defRPr>
+            </a:lvl3pPr>
+            <a:lvl4pPr marR="0" lvl="3" algn="l" rtl="0">
+              <a:lnSpc>
+                <a:spcPct val="100000"/>
+              </a:lnSpc>
+              <a:spcBef>
+                <a:spcPts val="0"/>
+              </a:spcBef>
+              <a:spcAft>
+                <a:spcPts val="0"/>
+              </a:spcAft>
+              <a:buClr>
+                <a:srgbClr val="FFF9D9"/>
+              </a:buClr>
+              <a:buSzPts val="2000"/>
+              <a:buFont typeface="Nunito"/>
+              <a:buNone/>
+              <a:defRPr sz="2000" b="1" i="0" u="none" strike="noStrike" cap="none">
+                <a:solidFill>
+                  <a:srgbClr val="FFF9D9"/>
+                </a:solidFill>
+                <a:latin typeface="Nunito"/>
+                <a:ea typeface="Nunito"/>
+                <a:cs typeface="Nunito"/>
+                <a:sym typeface="Nunito"/>
+              </a:defRPr>
+            </a:lvl4pPr>
+            <a:lvl5pPr marR="0" lvl="4" algn="l" rtl="0">
+              <a:lnSpc>
+                <a:spcPct val="100000"/>
+              </a:lnSpc>
+              <a:spcBef>
+                <a:spcPts val="0"/>
+              </a:spcBef>
+              <a:spcAft>
+                <a:spcPts val="0"/>
+              </a:spcAft>
+              <a:buClr>
+                <a:srgbClr val="FFF9D9"/>
+              </a:buClr>
+              <a:buSzPts val="2000"/>
+              <a:buFont typeface="Nunito"/>
+              <a:buNone/>
+              <a:defRPr sz="2000" b="1" i="0" u="none" strike="noStrike" cap="none">
+                <a:solidFill>
+                  <a:srgbClr val="FFF9D9"/>
+                </a:solidFill>
+                <a:latin typeface="Nunito"/>
+                <a:ea typeface="Nunito"/>
+                <a:cs typeface="Nunito"/>
+                <a:sym typeface="Nunito"/>
+              </a:defRPr>
+            </a:lvl5pPr>
+            <a:lvl6pPr marR="0" lvl="5" algn="l" rtl="0">
+              <a:lnSpc>
+                <a:spcPct val="100000"/>
+              </a:lnSpc>
+              <a:spcBef>
+                <a:spcPts val="0"/>
+              </a:spcBef>
+              <a:spcAft>
+                <a:spcPts val="0"/>
+              </a:spcAft>
+              <a:buClr>
+                <a:srgbClr val="FFF9D9"/>
+              </a:buClr>
+              <a:buSzPts val="2000"/>
+              <a:buFont typeface="Nunito"/>
+              <a:buNone/>
+              <a:defRPr sz="2000" b="1" i="0" u="none" strike="noStrike" cap="none">
+                <a:solidFill>
+                  <a:srgbClr val="FFF9D9"/>
+                </a:solidFill>
+                <a:latin typeface="Nunito"/>
+                <a:ea typeface="Nunito"/>
+                <a:cs typeface="Nunito"/>
+                <a:sym typeface="Nunito"/>
+              </a:defRPr>
+            </a:lvl6pPr>
+            <a:lvl7pPr marR="0" lvl="6" algn="l" rtl="0">
+              <a:lnSpc>
+                <a:spcPct val="100000"/>
+              </a:lnSpc>
+              <a:spcBef>
+                <a:spcPts val="0"/>
+              </a:spcBef>
+              <a:spcAft>
+                <a:spcPts val="0"/>
+              </a:spcAft>
+              <a:buClr>
+                <a:srgbClr val="FFF9D9"/>
+              </a:buClr>
+              <a:buSzPts val="2000"/>
+              <a:buFont typeface="Nunito"/>
+              <a:buNone/>
+              <a:defRPr sz="2000" b="1" i="0" u="none" strike="noStrike" cap="none">
+                <a:solidFill>
+                  <a:srgbClr val="FFF9D9"/>
+                </a:solidFill>
+                <a:latin typeface="Nunito"/>
+                <a:ea typeface="Nunito"/>
+                <a:cs typeface="Nunito"/>
+                <a:sym typeface="Nunito"/>
+              </a:defRPr>
+            </a:lvl7pPr>
+            <a:lvl8pPr marR="0" lvl="7" algn="l" rtl="0">
+              <a:lnSpc>
+                <a:spcPct val="100000"/>
+              </a:lnSpc>
+              <a:spcBef>
+                <a:spcPts val="0"/>
+              </a:spcBef>
+              <a:spcAft>
+                <a:spcPts val="0"/>
+              </a:spcAft>
+              <a:buClr>
+                <a:srgbClr val="FFF9D9"/>
+              </a:buClr>
+              <a:buSzPts val="2000"/>
+              <a:buFont typeface="Nunito"/>
+              <a:buNone/>
+              <a:defRPr sz="2000" b="1" i="0" u="none" strike="noStrike" cap="none">
+                <a:solidFill>
+                  <a:srgbClr val="FFF9D9"/>
+                </a:solidFill>
+                <a:latin typeface="Nunito"/>
+                <a:ea typeface="Nunito"/>
+                <a:cs typeface="Nunito"/>
+                <a:sym typeface="Nunito"/>
+              </a:defRPr>
+            </a:lvl8pPr>
+            <a:lvl9pPr marR="0" lvl="8" algn="l" rtl="0">
+              <a:lnSpc>
+                <a:spcPct val="100000"/>
+              </a:lnSpc>
+              <a:spcBef>
+                <a:spcPts val="0"/>
+              </a:spcBef>
+              <a:spcAft>
+                <a:spcPts val="0"/>
+              </a:spcAft>
+              <a:buClr>
+                <a:srgbClr val="FFF9D9"/>
+              </a:buClr>
+              <a:buSzPts val="2000"/>
+              <a:buFont typeface="Nunito"/>
+              <a:buNone/>
+              <a:defRPr sz="2000" b="1" i="0" u="none" strike="noStrike" cap="none">
+                <a:solidFill>
+                  <a:srgbClr val="FFF9D9"/>
+                </a:solidFill>
+                <a:latin typeface="Nunito"/>
+                <a:ea typeface="Nunito"/>
+                <a:cs typeface="Nunito"/>
+                <a:sym typeface="Nunito"/>
+              </a:defRPr>
+            </a:lvl9pPr>
+          </a:lstStyle>
+          <a:p>
+            <a:pPr algn="ctr">
+              <a:lnSpc>
+                <a:spcPct val="150000"/>
+              </a:lnSpc>
+            </a:pPr>
+            <a:r>
+              <a:rPr lang="pt-BR" sz="1400" dirty="0">
+                <a:solidFill>
+                  <a:srgbClr val="CC8A42"/>
+                </a:solidFill>
+              </a:rPr>
+              <a:t>{{</a:t>
+            </a:r>
+            <a:r>
+              <a:rPr lang="pt-BR" sz="1400" dirty="0" err="1">
+                <a:solidFill>
+                  <a:srgbClr val="CC8A42"/>
+                </a:solidFill>
+              </a:rPr>
+              <a:t>nota_lider_lider</a:t>
+            </a:r>
+            <a:r>
+              <a:rPr lang="pt-BR" sz="1400" dirty="0">
+                <a:solidFill>
+                  <a:srgbClr val="CC8A42"/>
+                </a:solidFill>
+              </a:rPr>
+              <a:t>}}</a:t>
+            </a:r>
+            <a:endParaRPr lang="pt-BR" dirty="0">
+              <a:solidFill>
+                <a:srgbClr val="CC8A42"/>
+              </a:solidFill>
+            </a:endParaRPr>
+          </a:p>
+        </p:txBody>
+      </p:sp>
+      <p:sp>
+        <p:nvSpPr>
+          <p:cNvPr id="9" name="Google Shape;494;p69">
+            <a:extLst>
+              <a:ext uri="{FF2B5EF4-FFF2-40B4-BE49-F238E27FC236}">
+                <a16:creationId xmlns:a16="http://schemas.microsoft.com/office/drawing/2014/main" id="{FAC42052-1087-55EA-3A41-067FA2E63941}"/>
+              </a:ext>
+            </a:extLst>
+          </p:cNvPr>
+          <p:cNvSpPr txBox="1">
+            <a:spLocks/>
+          </p:cNvSpPr>
+          <p:nvPr/>
+        </p:nvSpPr>
+        <p:spPr>
+          <a:xfrm>
+            <a:off x="6754090" y="1366989"/>
+            <a:ext cx="2005652" cy="528768"/>
+          </a:xfrm>
+          <a:prstGeom prst="rect">
+            <a:avLst/>
+          </a:prstGeom>
+          <a:noFill/>
+          <a:ln>
+            <a:noFill/>
+          </a:ln>
+        </p:spPr>
+        <p:txBody>
+          <a:bodyPr spcFirstLastPara="1" wrap="square" lIns="91425" tIns="91425" rIns="91425" bIns="91425" anchor="t" anchorCtr="0">
+            <a:normAutofit fontScale="92500"/>
+          </a:bodyPr>
+          <a:lstStyle>
+            <a:defPPr marR="0" lvl="0" algn="l" rtl="0">
+              <a:lnSpc>
+                <a:spcPct val="100000"/>
+              </a:lnSpc>
+              <a:spcBef>
+                <a:spcPts val="0"/>
+              </a:spcBef>
+              <a:spcAft>
+                <a:spcPts val="0"/>
+              </a:spcAft>
+            </a:defPPr>
+            <a:lvl1pPr marR="0" lvl="0" algn="l" rtl="0">
+              <a:lnSpc>
+                <a:spcPct val="100000"/>
+              </a:lnSpc>
+              <a:spcBef>
+                <a:spcPts val="0"/>
+              </a:spcBef>
+              <a:spcAft>
+                <a:spcPts val="0"/>
+              </a:spcAft>
+              <a:buClr>
+                <a:schemeClr val="lt1"/>
+              </a:buClr>
+              <a:buSzPts val="2000"/>
+              <a:buFont typeface="Nunito"/>
+              <a:buNone/>
+              <a:defRPr sz="2000" b="1" i="0" u="none" strike="noStrike" cap="none">
+                <a:solidFill>
+                  <a:schemeClr val="lt1"/>
+                </a:solidFill>
+                <a:latin typeface="Nunito"/>
+                <a:ea typeface="Nunito"/>
+                <a:cs typeface="Nunito"/>
+                <a:sym typeface="Nunito"/>
+              </a:defRPr>
+            </a:lvl1pPr>
+            <a:lvl2pPr marR="0" lvl="1" algn="l" rtl="0">
+              <a:lnSpc>
+                <a:spcPct val="100000"/>
+              </a:lnSpc>
+              <a:spcBef>
+                <a:spcPts val="0"/>
+              </a:spcBef>
+              <a:spcAft>
+                <a:spcPts val="0"/>
+              </a:spcAft>
+              <a:buClr>
+                <a:srgbClr val="FFF9D9"/>
+              </a:buClr>
+              <a:buSzPts val="2000"/>
+              <a:buFont typeface="Nunito"/>
+              <a:buNone/>
+              <a:defRPr sz="2000" b="1" i="0" u="none" strike="noStrike" cap="none">
+                <a:solidFill>
+                  <a:srgbClr val="FFF9D9"/>
+                </a:solidFill>
+                <a:latin typeface="Nunito"/>
+                <a:ea typeface="Nunito"/>
+                <a:cs typeface="Nunito"/>
+                <a:sym typeface="Nunito"/>
+              </a:defRPr>
+            </a:lvl2pPr>
+            <a:lvl3pPr marR="0" lvl="2" algn="l" rtl="0">
+              <a:lnSpc>
+                <a:spcPct val="100000"/>
+              </a:lnSpc>
+              <a:spcBef>
+                <a:spcPts val="0"/>
+              </a:spcBef>
+              <a:spcAft>
+                <a:spcPts val="0"/>
+              </a:spcAft>
+              <a:buClr>
+                <a:srgbClr val="FFF9D9"/>
+              </a:buClr>
+              <a:buSzPts val="2000"/>
+              <a:buFont typeface="Nunito"/>
+              <a:buNone/>
+              <a:defRPr sz="2000" b="1" i="0" u="none" strike="noStrike" cap="none">
+                <a:solidFill>
+                  <a:srgbClr val="FFF9D9"/>
+                </a:solidFill>
+                <a:latin typeface="Nunito"/>
+                <a:ea typeface="Nunito"/>
+                <a:cs typeface="Nunito"/>
+                <a:sym typeface="Nunito"/>
+              </a:defRPr>
+            </a:lvl3pPr>
+            <a:lvl4pPr marR="0" lvl="3" algn="l" rtl="0">
+              <a:lnSpc>
+                <a:spcPct val="100000"/>
+              </a:lnSpc>
+              <a:spcBef>
+                <a:spcPts val="0"/>
+              </a:spcBef>
+              <a:spcAft>
+                <a:spcPts val="0"/>
+              </a:spcAft>
+              <a:buClr>
+                <a:srgbClr val="FFF9D9"/>
+              </a:buClr>
+              <a:buSzPts val="2000"/>
+              <a:buFont typeface="Nunito"/>
+              <a:buNone/>
+              <a:defRPr sz="2000" b="1" i="0" u="none" strike="noStrike" cap="none">
+                <a:solidFill>
+                  <a:srgbClr val="FFF9D9"/>
+                </a:solidFill>
+                <a:latin typeface="Nunito"/>
+                <a:ea typeface="Nunito"/>
+                <a:cs typeface="Nunito"/>
+                <a:sym typeface="Nunito"/>
+              </a:defRPr>
+            </a:lvl4pPr>
+            <a:lvl5pPr marR="0" lvl="4" algn="l" rtl="0">
+              <a:lnSpc>
+                <a:spcPct val="100000"/>
+              </a:lnSpc>
+              <a:spcBef>
+                <a:spcPts val="0"/>
+              </a:spcBef>
+              <a:spcAft>
+                <a:spcPts val="0"/>
+              </a:spcAft>
+              <a:buClr>
+                <a:srgbClr val="FFF9D9"/>
+              </a:buClr>
+              <a:buSzPts val="2000"/>
+              <a:buFont typeface="Nunito"/>
+              <a:buNone/>
+              <a:defRPr sz="2000" b="1" i="0" u="none" strike="noStrike" cap="none">
+                <a:solidFill>
+                  <a:srgbClr val="FFF9D9"/>
+                </a:solidFill>
+                <a:latin typeface="Nunito"/>
+                <a:ea typeface="Nunito"/>
+                <a:cs typeface="Nunito"/>
+                <a:sym typeface="Nunito"/>
+              </a:defRPr>
+            </a:lvl5pPr>
+            <a:lvl6pPr marR="0" lvl="5" algn="l" rtl="0">
+              <a:lnSpc>
+                <a:spcPct val="100000"/>
+              </a:lnSpc>
+              <a:spcBef>
+                <a:spcPts val="0"/>
+              </a:spcBef>
+              <a:spcAft>
+                <a:spcPts val="0"/>
+              </a:spcAft>
+              <a:buClr>
+                <a:srgbClr val="FFF9D9"/>
+              </a:buClr>
+              <a:buSzPts val="2000"/>
+              <a:buFont typeface="Nunito"/>
+              <a:buNone/>
+              <a:defRPr sz="2000" b="1" i="0" u="none" strike="noStrike" cap="none">
+                <a:solidFill>
+                  <a:srgbClr val="FFF9D9"/>
+                </a:solidFill>
+                <a:latin typeface="Nunito"/>
+                <a:ea typeface="Nunito"/>
+                <a:cs typeface="Nunito"/>
+                <a:sym typeface="Nunito"/>
+              </a:defRPr>
+            </a:lvl6pPr>
+            <a:lvl7pPr marR="0" lvl="6" algn="l" rtl="0">
+              <a:lnSpc>
+                <a:spcPct val="100000"/>
+              </a:lnSpc>
+              <a:spcBef>
+                <a:spcPts val="0"/>
+              </a:spcBef>
+              <a:spcAft>
+                <a:spcPts val="0"/>
+              </a:spcAft>
+              <a:buClr>
+                <a:srgbClr val="FFF9D9"/>
+              </a:buClr>
+              <a:buSzPts val="2000"/>
+              <a:buFont typeface="Nunito"/>
+              <a:buNone/>
+              <a:defRPr sz="2000" b="1" i="0" u="none" strike="noStrike" cap="none">
+                <a:solidFill>
+                  <a:srgbClr val="FFF9D9"/>
+                </a:solidFill>
+                <a:latin typeface="Nunito"/>
+                <a:ea typeface="Nunito"/>
+                <a:cs typeface="Nunito"/>
+                <a:sym typeface="Nunito"/>
+              </a:defRPr>
+            </a:lvl7pPr>
+            <a:lvl8pPr marR="0" lvl="7" algn="l" rtl="0">
+              <a:lnSpc>
+                <a:spcPct val="100000"/>
+              </a:lnSpc>
+              <a:spcBef>
+                <a:spcPts val="0"/>
+              </a:spcBef>
+              <a:spcAft>
+                <a:spcPts val="0"/>
+              </a:spcAft>
+              <a:buClr>
+                <a:srgbClr val="FFF9D9"/>
+              </a:buClr>
+              <a:buSzPts val="2000"/>
+              <a:buFont typeface="Nunito"/>
+              <a:buNone/>
+              <a:defRPr sz="2000" b="1" i="0" u="none" strike="noStrike" cap="none">
+                <a:solidFill>
+                  <a:srgbClr val="FFF9D9"/>
+                </a:solidFill>
+                <a:latin typeface="Nunito"/>
+                <a:ea typeface="Nunito"/>
+                <a:cs typeface="Nunito"/>
+                <a:sym typeface="Nunito"/>
+              </a:defRPr>
+            </a:lvl8pPr>
+            <a:lvl9pPr marR="0" lvl="8" algn="l" rtl="0">
+              <a:lnSpc>
+                <a:spcPct val="100000"/>
+              </a:lnSpc>
+              <a:spcBef>
+                <a:spcPts val="0"/>
+              </a:spcBef>
+              <a:spcAft>
+                <a:spcPts val="0"/>
+              </a:spcAft>
+              <a:buClr>
+                <a:srgbClr val="FFF9D9"/>
+              </a:buClr>
+              <a:buSzPts val="2000"/>
+              <a:buFont typeface="Nunito"/>
+              <a:buNone/>
+              <a:defRPr sz="2000" b="1" i="0" u="none" strike="noStrike" cap="none">
+                <a:solidFill>
+                  <a:srgbClr val="FFF9D9"/>
+                </a:solidFill>
+                <a:latin typeface="Nunito"/>
+                <a:ea typeface="Nunito"/>
+                <a:cs typeface="Nunito"/>
+                <a:sym typeface="Nunito"/>
+              </a:defRPr>
+            </a:lvl9pPr>
+          </a:lstStyle>
+          <a:p>
+            <a:pPr algn="ctr">
+              <a:lnSpc>
+                <a:spcPct val="150000"/>
+              </a:lnSpc>
+            </a:pPr>
+            <a:r>
+              <a:rPr lang="pt-BR" sz="1400" dirty="0">
+                <a:solidFill>
+                  <a:srgbClr val="CC8A42"/>
+                </a:solidFill>
+              </a:rPr>
+              <a:t>{{</a:t>
+            </a:r>
+            <a:r>
+              <a:rPr lang="pt-BR" sz="1400" dirty="0" err="1">
+                <a:solidFill>
+                  <a:srgbClr val="CC8A42"/>
+                </a:solidFill>
+              </a:rPr>
+              <a:t>nota_lider_liderado</a:t>
             </a:r>
             <a:r>
               <a:rPr lang="pt-BR" sz="1400" dirty="0">

</xml_diff>

<commit_message>
Correção dos gráficos de radar: posição das labels e legenda
</commit_message>
<xml_diff>
--- a/templates/[GARN] Modelo de apresentação de slides.pptx
+++ b/templates/[GARN] Modelo de apresentação de slides.pptx
@@ -20506,8 +20506,8 @@
         </p:nvSpPr>
         <p:spPr>
           <a:xfrm>
-            <a:off x="2964873" y="1932709"/>
-            <a:ext cx="5960658" cy="2604655"/>
+            <a:off x="3484418" y="1858804"/>
+            <a:ext cx="5080894" cy="2604655"/>
           </a:xfrm>
           <a:prstGeom prst="rect">
             <a:avLst/>
@@ -26117,8 +26117,8 @@
         </p:nvSpPr>
         <p:spPr>
           <a:xfrm>
-            <a:off x="2964873" y="1932709"/>
-            <a:ext cx="5960658" cy="2604655"/>
+            <a:off x="3359726" y="1895757"/>
+            <a:ext cx="5344131" cy="2604655"/>
           </a:xfrm>
           <a:prstGeom prst="rect">
             <a:avLst/>

</xml_diff>